<commit_message>
moved assets image folder
</commit_message>
<xml_diff>
--- a/diagram/CryptoPredictor.pptx
+++ b/diagram/CryptoPredictor.pptx
@@ -5,17 +5,18 @@
     <p:sldMasterId id="2147483648" r:id="rId4"/>
   </p:sldMasterIdLst>
   <p:notesMasterIdLst>
-    <p:notesMasterId r:id="rId13"/>
+    <p:notesMasterId r:id="rId14"/>
   </p:notesMasterIdLst>
   <p:sldIdLst>
     <p:sldId id="256" r:id="rId5"/>
     <p:sldId id="257" r:id="rId6"/>
-    <p:sldId id="281" r:id="rId7"/>
-    <p:sldId id="282" r:id="rId8"/>
-    <p:sldId id="278" r:id="rId9"/>
-    <p:sldId id="279" r:id="rId10"/>
-    <p:sldId id="258" r:id="rId11"/>
-    <p:sldId id="269" r:id="rId12"/>
+    <p:sldId id="278" r:id="rId7"/>
+    <p:sldId id="279" r:id="rId8"/>
+    <p:sldId id="281" r:id="rId9"/>
+    <p:sldId id="282" r:id="rId10"/>
+    <p:sldId id="283" r:id="rId11"/>
+    <p:sldId id="258" r:id="rId12"/>
+    <p:sldId id="269" r:id="rId13"/>
   </p:sldIdLst>
   <p:sldSz cx="9144000" cy="6858000" type="screen4x3"/>
   <p:notesSz cx="6858000" cy="9144000"/>
@@ -1123,7 +1124,7 @@
           <a:p>
             <a:fld id="{0EF95162-6873-F647-B392-BF6A1F606277}" type="datetimeFigureOut">
               <a:rPr lang="it-IT" smtClean="0"/>
-              <a:t>03/03/2022</a:t>
+              <a:t>07/03/2022</a:t>
             </a:fld>
             <a:endParaRPr lang="it-IT"/>
           </a:p>
@@ -1577,7 +1578,7 @@
           <a:p>
             <a:fld id="{2FDCBEE4-315A-8E42-835E-29A1DAE07625}" type="datetimeFigureOut">
               <a:rPr lang="it-IT" smtClean="0"/>
-              <a:t>03/03/2022</a:t>
+              <a:t>07/03/2022</a:t>
             </a:fld>
             <a:endParaRPr lang="it-IT"/>
           </a:p>
@@ -1769,7 +1770,7 @@
           <a:p>
             <a:fld id="{2FDCBEE4-315A-8E42-835E-29A1DAE07625}" type="datetimeFigureOut">
               <a:rPr lang="it-IT" smtClean="0"/>
-              <a:t>03/03/2022</a:t>
+              <a:t>07/03/2022</a:t>
             </a:fld>
             <a:endParaRPr lang="it-IT"/>
           </a:p>
@@ -1971,7 +1972,7 @@
           <a:p>
             <a:fld id="{2FDCBEE4-315A-8E42-835E-29A1DAE07625}" type="datetimeFigureOut">
               <a:rPr lang="it-IT" smtClean="0"/>
-              <a:t>03/03/2022</a:t>
+              <a:t>07/03/2022</a:t>
             </a:fld>
             <a:endParaRPr lang="it-IT"/>
           </a:p>
@@ -2163,7 +2164,7 @@
           <a:p>
             <a:fld id="{2FDCBEE4-315A-8E42-835E-29A1DAE07625}" type="datetimeFigureOut">
               <a:rPr lang="it-IT" smtClean="0"/>
-              <a:t>03/03/2022</a:t>
+              <a:t>07/03/2022</a:t>
             </a:fld>
             <a:endParaRPr lang="it-IT"/>
           </a:p>
@@ -2432,7 +2433,7 @@
           <a:p>
             <a:fld id="{2FDCBEE4-315A-8E42-835E-29A1DAE07625}" type="datetimeFigureOut">
               <a:rPr lang="it-IT" smtClean="0"/>
-              <a:t>03/03/2022</a:t>
+              <a:t>07/03/2022</a:t>
             </a:fld>
             <a:endParaRPr lang="it-IT"/>
           </a:p>
@@ -2741,7 +2742,7 @@
           <a:p>
             <a:fld id="{2FDCBEE4-315A-8E42-835E-29A1DAE07625}" type="datetimeFigureOut">
               <a:rPr lang="it-IT" smtClean="0"/>
-              <a:t>03/03/2022</a:t>
+              <a:t>07/03/2022</a:t>
             </a:fld>
             <a:endParaRPr lang="it-IT"/>
           </a:p>
@@ -3184,7 +3185,7 @@
           <a:p>
             <a:fld id="{2FDCBEE4-315A-8E42-835E-29A1DAE07625}" type="datetimeFigureOut">
               <a:rPr lang="it-IT" smtClean="0"/>
-              <a:t>03/03/2022</a:t>
+              <a:t>07/03/2022</a:t>
             </a:fld>
             <a:endParaRPr lang="it-IT"/>
           </a:p>
@@ -3325,7 +3326,7 @@
           <a:p>
             <a:fld id="{2FDCBEE4-315A-8E42-835E-29A1DAE07625}" type="datetimeFigureOut">
               <a:rPr lang="it-IT" smtClean="0"/>
-              <a:t>03/03/2022</a:t>
+              <a:t>07/03/2022</a:t>
             </a:fld>
             <a:endParaRPr lang="it-IT"/>
           </a:p>
@@ -3444,7 +3445,7 @@
           <a:p>
             <a:fld id="{2FDCBEE4-315A-8E42-835E-29A1DAE07625}" type="datetimeFigureOut">
               <a:rPr lang="it-IT" smtClean="0"/>
-              <a:t>03/03/2022</a:t>
+              <a:t>07/03/2022</a:t>
             </a:fld>
             <a:endParaRPr lang="it-IT"/>
           </a:p>
@@ -3743,7 +3744,7 @@
           <a:p>
             <a:fld id="{2FDCBEE4-315A-8E42-835E-29A1DAE07625}" type="datetimeFigureOut">
               <a:rPr lang="it-IT" smtClean="0"/>
-              <a:t>03/03/2022</a:t>
+              <a:t>07/03/2022</a:t>
             </a:fld>
             <a:endParaRPr lang="it-IT"/>
           </a:p>
@@ -4019,7 +4020,7 @@
           <a:p>
             <a:fld id="{2FDCBEE4-315A-8E42-835E-29A1DAE07625}" type="datetimeFigureOut">
               <a:rPr lang="it-IT" smtClean="0"/>
-              <a:t>03/03/2022</a:t>
+              <a:t>07/03/2022</a:t>
             </a:fld>
             <a:endParaRPr lang="it-IT"/>
           </a:p>
@@ -5019,6 +5020,442 @@
           <p:cNvPr id="2" name="Titolo 1">
             <a:extLst>
               <a:ext uri="{FF2B5EF4-FFF2-40B4-BE49-F238E27FC236}">
+                <a16:creationId xmlns:a16="http://schemas.microsoft.com/office/drawing/2014/main" id="{6EC605A9-849A-40C9-9112-DDE9E481D89A}"/>
+              </a:ext>
+            </a:extLst>
+          </p:cNvPr>
+          <p:cNvSpPr>
+            <a:spLocks noGrp="1"/>
+          </p:cNvSpPr>
+          <p:nvPr>
+            <p:ph type="title"/>
+          </p:nvPr>
+        </p:nvSpPr>
+        <p:spPr>
+          <a:xfrm>
+            <a:off x="182741" y="90093"/>
+            <a:ext cx="8761797" cy="650886"/>
+          </a:xfrm>
+        </p:spPr>
+        <p:txBody>
+          <a:bodyPr>
+            <a:normAutofit fontScale="90000"/>
+          </a:bodyPr>
+          <a:lstStyle/>
+          <a:p>
+            <a:r>
+              <a:rPr lang="it-IT" dirty="0"/>
+              <a:t>Dataset </a:t>
+            </a:r>
+            <a:r>
+              <a:rPr lang="it-IT" dirty="0" err="1"/>
+              <a:t>Description</a:t>
+            </a:r>
+            <a:endParaRPr lang="it-IT" dirty="0"/>
+          </a:p>
+        </p:txBody>
+      </p:sp>
+      <p:sp>
+        <p:nvSpPr>
+          <p:cNvPr id="3" name="CasellaDiTesto 2">
+            <a:extLst>
+              <a:ext uri="{FF2B5EF4-FFF2-40B4-BE49-F238E27FC236}">
+                <a16:creationId xmlns:a16="http://schemas.microsoft.com/office/drawing/2014/main" id="{49E446A2-CE3B-4DB1-B20D-0F385D0BED08}"/>
+              </a:ext>
+            </a:extLst>
+          </p:cNvPr>
+          <p:cNvSpPr txBox="1"/>
+          <p:nvPr/>
+        </p:nvSpPr>
+        <p:spPr>
+          <a:xfrm>
+            <a:off x="347797" y="740979"/>
+            <a:ext cx="8613462" cy="5909310"/>
+          </a:xfrm>
+          <a:prstGeom prst="rect">
+            <a:avLst/>
+          </a:prstGeom>
+          <a:noFill/>
+        </p:spPr>
+        <p:txBody>
+          <a:bodyPr wrap="square" rtlCol="0">
+            <a:spAutoFit/>
+          </a:bodyPr>
+          <a:lstStyle/>
+          <a:p>
+            <a:r>
+              <a:rPr lang="en-US" sz="2400" b="1" i="1" dirty="0"/>
+              <a:t>Source: </a:t>
+            </a:r>
+            <a:r>
+              <a:rPr lang="en-US" sz="2400" dirty="0"/>
+              <a:t>we</a:t>
+            </a:r>
+            <a:r>
+              <a:rPr lang="en-US" sz="2400" b="1" i="1" dirty="0"/>
+              <a:t> </a:t>
+            </a:r>
+            <a:r>
+              <a:rPr lang="en-GB" sz="2400" dirty="0"/>
+              <a:t>scraped from Yahoo Finance API the crypto historical values of the last 5 years (between 2017 and 2022) for each of the 10 most popular currencies:</a:t>
+            </a:r>
+          </a:p>
+          <a:p>
+            <a:endParaRPr lang="en-GB" sz="2400" dirty="0"/>
+          </a:p>
+          <a:p>
+            <a:pPr marL="2628900" lvl="5" indent="-342900">
+              <a:buFontTx/>
+              <a:buChar char="-"/>
+            </a:pPr>
+            <a:r>
+              <a:rPr lang="en-GB" sz="2400" dirty="0"/>
+              <a:t>Ethereum</a:t>
+            </a:r>
+          </a:p>
+          <a:p>
+            <a:pPr marL="2628900" lvl="5" indent="-342900">
+              <a:buFontTx/>
+              <a:buChar char="-"/>
+            </a:pPr>
+            <a:r>
+              <a:rPr lang="en-GB" sz="2400" dirty="0"/>
+              <a:t>Bitcoin</a:t>
+            </a:r>
+          </a:p>
+          <a:p>
+            <a:pPr marL="2628900" lvl="5" indent="-342900">
+              <a:buFontTx/>
+              <a:buChar char="-"/>
+            </a:pPr>
+            <a:r>
+              <a:rPr lang="en-GB" sz="2400" dirty="0"/>
+              <a:t>Tether</a:t>
+            </a:r>
+          </a:p>
+          <a:p>
+            <a:pPr marL="2628900" lvl="5" indent="-342900">
+              <a:buFontTx/>
+              <a:buChar char="-"/>
+            </a:pPr>
+            <a:r>
+              <a:rPr lang="en-GB" sz="2400" dirty="0" err="1"/>
+              <a:t>Binance</a:t>
+            </a:r>
+            <a:endParaRPr lang="en-GB" sz="2400" dirty="0"/>
+          </a:p>
+          <a:p>
+            <a:pPr marL="2628900" lvl="5" indent="-342900">
+              <a:buFontTx/>
+              <a:buChar char="-"/>
+            </a:pPr>
+            <a:r>
+              <a:rPr lang="en-GB" sz="2400" dirty="0"/>
+              <a:t>USD</a:t>
+            </a:r>
+          </a:p>
+          <a:p>
+            <a:pPr lvl="0"/>
+            <a:endParaRPr lang="en-US" sz="2400" b="1" i="1" dirty="0"/>
+          </a:p>
+          <a:p>
+            <a:pPr lvl="0"/>
+            <a:r>
+              <a:rPr lang="en-US" sz="2800" b="1" i="1" dirty="0"/>
+              <a:t>Description: </a:t>
+            </a:r>
+            <a:r>
+              <a:rPr lang="en-US" sz="2400" dirty="0"/>
+              <a:t>This dataset contains information on the past financial values of the currencies, in particular: data from the past 5 years from 10 different currencies for a total of 18.860 (365 * 5 years * 10 currencies) different tuples.</a:t>
+            </a:r>
+            <a:endParaRPr lang="en-US" sz="2800" b="1" i="1" dirty="0"/>
+          </a:p>
+          <a:p>
+            <a:pPr lvl="0"/>
+            <a:endParaRPr lang="en-US" sz="2000" b="1" i="1" dirty="0"/>
+          </a:p>
+          <a:p>
+            <a:endParaRPr lang="it-IT" dirty="0"/>
+          </a:p>
+        </p:txBody>
+      </p:sp>
+      <p:sp>
+        <p:nvSpPr>
+          <p:cNvPr id="4" name="CasellaDiTesto 3">
+            <a:extLst>
+              <a:ext uri="{FF2B5EF4-FFF2-40B4-BE49-F238E27FC236}">
+                <a16:creationId xmlns:a16="http://schemas.microsoft.com/office/drawing/2014/main" id="{8B85BA37-5F3C-492D-A898-9716D590A452}"/>
+              </a:ext>
+            </a:extLst>
+          </p:cNvPr>
+          <p:cNvSpPr txBox="1"/>
+          <p:nvPr/>
+        </p:nvSpPr>
+        <p:spPr>
+          <a:xfrm>
+            <a:off x="4903075" y="2191490"/>
+            <a:ext cx="1753429" cy="1938992"/>
+          </a:xfrm>
+          <a:prstGeom prst="rect">
+            <a:avLst/>
+          </a:prstGeom>
+          <a:noFill/>
+        </p:spPr>
+        <p:txBody>
+          <a:bodyPr wrap="none" rtlCol="0">
+            <a:spAutoFit/>
+          </a:bodyPr>
+          <a:lstStyle/>
+          <a:p>
+            <a:pPr marL="285750" indent="-285750">
+              <a:buFontTx/>
+              <a:buChar char="-"/>
+            </a:pPr>
+            <a:r>
+              <a:rPr lang="it-IT" sz="2400" dirty="0"/>
+              <a:t>XRP</a:t>
+            </a:r>
+          </a:p>
+          <a:p>
+            <a:pPr marL="285750" indent="-285750">
+              <a:buFontTx/>
+              <a:buChar char="-"/>
+            </a:pPr>
+            <a:r>
+              <a:rPr lang="it-IT" sz="2400" dirty="0"/>
+              <a:t>Cardano</a:t>
+            </a:r>
+          </a:p>
+          <a:p>
+            <a:pPr marL="285750" indent="-285750">
+              <a:buFontTx/>
+              <a:buChar char="-"/>
+            </a:pPr>
+            <a:r>
+              <a:rPr lang="it-IT" sz="2400" dirty="0" err="1"/>
+              <a:t>Solana</a:t>
+            </a:r>
+            <a:endParaRPr lang="it-IT" sz="2400" dirty="0"/>
+          </a:p>
+          <a:p>
+            <a:pPr marL="285750" indent="-285750">
+              <a:buFontTx/>
+              <a:buChar char="-"/>
+            </a:pPr>
+            <a:r>
+              <a:rPr lang="it-IT" sz="2400" dirty="0"/>
+              <a:t>Terra</a:t>
+            </a:r>
+          </a:p>
+          <a:p>
+            <a:pPr marL="285750" indent="-285750">
+              <a:buFontTx/>
+              <a:buChar char="-"/>
+            </a:pPr>
+            <a:r>
+              <a:rPr lang="it-IT" sz="2400" dirty="0" err="1"/>
+              <a:t>Avalanche</a:t>
+            </a:r>
+            <a:endParaRPr lang="it-IT" sz="2400" dirty="0"/>
+          </a:p>
+        </p:txBody>
+      </p:sp>
+    </p:spTree>
+    <p:extLst>
+      <p:ext uri="{BB962C8B-B14F-4D97-AF65-F5344CB8AC3E}">
+        <p14:creationId xmlns:p14="http://schemas.microsoft.com/office/powerpoint/2010/main" val="4285049540"/>
+      </p:ext>
+    </p:extLst>
+  </p:cSld>
+  <p:clrMapOvr>
+    <a:masterClrMapping/>
+  </p:clrMapOvr>
+</p:sld>
+</file>
+
+<file path=ppt/slides/slide4.xml><?xml version="1.0" encoding="utf-8"?>
+<p:sld xmlns:a="http://schemas.openxmlformats.org/drawingml/2006/main" xmlns:r="http://schemas.openxmlformats.org/officeDocument/2006/relationships" xmlns:p="http://schemas.openxmlformats.org/presentationml/2006/main">
+  <p:cSld>
+    <p:spTree>
+      <p:nvGrpSpPr>
+        <p:cNvPr id="1" name=""/>
+        <p:cNvGrpSpPr/>
+        <p:nvPr/>
+      </p:nvGrpSpPr>
+      <p:grpSpPr>
+        <a:xfrm>
+          <a:off x="0" y="0"/>
+          <a:ext cx="0" cy="0"/>
+          <a:chOff x="0" y="0"/>
+          <a:chExt cx="0" cy="0"/>
+        </a:xfrm>
+      </p:grpSpPr>
+      <p:pic>
+        <p:nvPicPr>
+          <p:cNvPr id="4" name="Immagine 3">
+            <a:extLst>
+              <a:ext uri="{FF2B5EF4-FFF2-40B4-BE49-F238E27FC236}">
+                <a16:creationId xmlns:a16="http://schemas.microsoft.com/office/drawing/2014/main" id="{4B35046C-0DA5-4D99-BF08-3D062AAAB59C}"/>
+              </a:ext>
+            </a:extLst>
+          </p:cNvPr>
+          <p:cNvPicPr>
+            <a:picLocks noChangeAspect="1"/>
+          </p:cNvPicPr>
+          <p:nvPr/>
+        </p:nvPicPr>
+        <p:blipFill>
+          <a:blip r:embed="rId2"/>
+          <a:stretch>
+            <a:fillRect/>
+          </a:stretch>
+        </p:blipFill>
+        <p:spPr>
+          <a:xfrm>
+            <a:off x="1141396" y="1874535"/>
+            <a:ext cx="6844486" cy="3928735"/>
+          </a:xfrm>
+          <a:prstGeom prst="rect">
+            <a:avLst/>
+          </a:prstGeom>
+        </p:spPr>
+      </p:pic>
+      <p:sp>
+        <p:nvSpPr>
+          <p:cNvPr id="5" name="Titolo 1">
+            <a:extLst>
+              <a:ext uri="{FF2B5EF4-FFF2-40B4-BE49-F238E27FC236}">
+                <a16:creationId xmlns:a16="http://schemas.microsoft.com/office/drawing/2014/main" id="{E766A7C9-84F1-4595-8E00-FFC8EE6989AC}"/>
+              </a:ext>
+            </a:extLst>
+          </p:cNvPr>
+          <p:cNvSpPr>
+            <a:spLocks noGrp="1"/>
+          </p:cNvSpPr>
+          <p:nvPr>
+            <p:ph type="title"/>
+          </p:nvPr>
+        </p:nvSpPr>
+        <p:spPr>
+          <a:xfrm>
+            <a:off x="182741" y="90093"/>
+            <a:ext cx="8761797" cy="1143000"/>
+          </a:xfrm>
+        </p:spPr>
+        <p:txBody>
+          <a:bodyPr/>
+          <a:lstStyle/>
+          <a:p>
+            <a:r>
+              <a:rPr lang="it-IT" dirty="0"/>
+              <a:t>Dataset </a:t>
+            </a:r>
+            <a:r>
+              <a:rPr lang="it-IT" dirty="0" err="1"/>
+              <a:t>Description</a:t>
+            </a:r>
+            <a:r>
+              <a:rPr lang="it-IT" dirty="0"/>
+              <a:t> II</a:t>
+            </a:r>
+          </a:p>
+        </p:txBody>
+      </p:sp>
+      <p:sp>
+        <p:nvSpPr>
+          <p:cNvPr id="2" name="CasellaDiTesto 1">
+            <a:extLst>
+              <a:ext uri="{FF2B5EF4-FFF2-40B4-BE49-F238E27FC236}">
+                <a16:creationId xmlns:a16="http://schemas.microsoft.com/office/drawing/2014/main" id="{F64E6CBA-C8CE-453B-A0C9-92E0C1925620}"/>
+              </a:ext>
+            </a:extLst>
+          </p:cNvPr>
+          <p:cNvSpPr txBox="1"/>
+          <p:nvPr/>
+        </p:nvSpPr>
+        <p:spPr>
+          <a:xfrm>
+            <a:off x="1141396" y="1369148"/>
+            <a:ext cx="4901214" cy="369332"/>
+          </a:xfrm>
+          <a:prstGeom prst="rect">
+            <a:avLst/>
+          </a:prstGeom>
+          <a:noFill/>
+        </p:spPr>
+        <p:txBody>
+          <a:bodyPr wrap="none" rtlCol="0">
+            <a:spAutoFit/>
+          </a:bodyPr>
+          <a:lstStyle/>
+          <a:p>
+            <a:r>
+              <a:rPr lang="it-IT" dirty="0" err="1"/>
+              <a:t>This</a:t>
+            </a:r>
+            <a:r>
+              <a:rPr lang="it-IT" dirty="0"/>
+              <a:t> dataset </a:t>
+            </a:r>
+            <a:r>
+              <a:rPr lang="it-IT" dirty="0" err="1"/>
+              <a:t>refers</a:t>
+            </a:r>
+            <a:r>
+              <a:rPr lang="it-IT" dirty="0"/>
+              <a:t> </a:t>
+            </a:r>
+            <a:r>
+              <a:rPr lang="it-IT" dirty="0" err="1"/>
+              <a:t>only</a:t>
+            </a:r>
+            <a:r>
+              <a:rPr lang="it-IT" dirty="0"/>
+              <a:t> to a single </a:t>
+            </a:r>
+            <a:r>
+              <a:rPr lang="it-IT" dirty="0" err="1"/>
+              <a:t>crypto-currency</a:t>
+            </a:r>
+            <a:endParaRPr lang="it-IT" dirty="0"/>
+          </a:p>
+        </p:txBody>
+      </p:sp>
+    </p:spTree>
+    <p:extLst>
+      <p:ext uri="{BB962C8B-B14F-4D97-AF65-F5344CB8AC3E}">
+        <p14:creationId xmlns:p14="http://schemas.microsoft.com/office/powerpoint/2010/main" val="175535551"/>
+      </p:ext>
+    </p:extLst>
+  </p:cSld>
+  <p:clrMapOvr>
+    <a:masterClrMapping/>
+  </p:clrMapOvr>
+</p:sld>
+</file>
+
+<file path=ppt/slides/slide5.xml><?xml version="1.0" encoding="utf-8"?>
+<p:sld xmlns:a="http://schemas.openxmlformats.org/drawingml/2006/main" xmlns:r="http://schemas.openxmlformats.org/officeDocument/2006/relationships" xmlns:p="http://schemas.openxmlformats.org/presentationml/2006/main">
+  <p:cSld>
+    <p:spTree>
+      <p:nvGrpSpPr>
+        <p:cNvPr id="1" name=""/>
+        <p:cNvGrpSpPr/>
+        <p:nvPr/>
+      </p:nvGrpSpPr>
+      <p:grpSpPr>
+        <a:xfrm>
+          <a:off x="0" y="0"/>
+          <a:ext cx="0" cy="0"/>
+          <a:chOff x="0" y="0"/>
+          <a:chExt cx="0" cy="0"/>
+        </a:xfrm>
+      </p:grpSpPr>
+      <p:sp>
+        <p:nvSpPr>
+          <p:cNvPr id="2" name="Titolo 1">
+            <a:extLst>
+              <a:ext uri="{FF2B5EF4-FFF2-40B4-BE49-F238E27FC236}">
                 <a16:creationId xmlns:a16="http://schemas.microsoft.com/office/drawing/2014/main" id="{5A91C834-1531-EF45-9F75-1C146E72C46B}"/>
               </a:ext>
             </a:extLst>
@@ -5303,7 +5740,7 @@
 </p:sld>
 </file>
 
-<file path=ppt/slides/slide4.xml><?xml version="1.0" encoding="utf-8"?>
+<file path=ppt/slides/slide6.xml><?xml version="1.0" encoding="utf-8"?>
 <p:sld xmlns:a="http://schemas.openxmlformats.org/drawingml/2006/main" xmlns:r="http://schemas.openxmlformats.org/officeDocument/2006/relationships" xmlns:p="http://schemas.openxmlformats.org/presentationml/2006/main">
   <p:cSld>
     <p:spTree>
@@ -5363,282 +5800,7 @@
 </p:sld>
 </file>
 
-<file path=ppt/slides/slide5.xml><?xml version="1.0" encoding="utf-8"?>
-<p:sld xmlns:a="http://schemas.openxmlformats.org/drawingml/2006/main" xmlns:r="http://schemas.openxmlformats.org/officeDocument/2006/relationships" xmlns:p="http://schemas.openxmlformats.org/presentationml/2006/main">
-  <p:cSld>
-    <p:spTree>
-      <p:nvGrpSpPr>
-        <p:cNvPr id="1" name=""/>
-        <p:cNvGrpSpPr/>
-        <p:nvPr/>
-      </p:nvGrpSpPr>
-      <p:grpSpPr>
-        <a:xfrm>
-          <a:off x="0" y="0"/>
-          <a:ext cx="0" cy="0"/>
-          <a:chOff x="0" y="0"/>
-          <a:chExt cx="0" cy="0"/>
-        </a:xfrm>
-      </p:grpSpPr>
-      <p:sp>
-        <p:nvSpPr>
-          <p:cNvPr id="2" name="Titolo 1">
-            <a:extLst>
-              <a:ext uri="{FF2B5EF4-FFF2-40B4-BE49-F238E27FC236}">
-                <a16:creationId xmlns:a16="http://schemas.microsoft.com/office/drawing/2014/main" id="{6EC605A9-849A-40C9-9112-DDE9E481D89A}"/>
-              </a:ext>
-            </a:extLst>
-          </p:cNvPr>
-          <p:cNvSpPr>
-            <a:spLocks noGrp="1"/>
-          </p:cNvSpPr>
-          <p:nvPr>
-            <p:ph type="title"/>
-          </p:nvPr>
-        </p:nvSpPr>
-        <p:spPr>
-          <a:xfrm>
-            <a:off x="182741" y="90093"/>
-            <a:ext cx="8761797" cy="650886"/>
-          </a:xfrm>
-        </p:spPr>
-        <p:txBody>
-          <a:bodyPr>
-            <a:normAutofit fontScale="90000"/>
-          </a:bodyPr>
-          <a:lstStyle/>
-          <a:p>
-            <a:r>
-              <a:rPr lang="it-IT" dirty="0"/>
-              <a:t>Dataset </a:t>
-            </a:r>
-            <a:r>
-              <a:rPr lang="it-IT" dirty="0" err="1"/>
-              <a:t>Description</a:t>
-            </a:r>
-            <a:endParaRPr lang="it-IT" dirty="0"/>
-          </a:p>
-        </p:txBody>
-      </p:sp>
-      <p:sp>
-        <p:nvSpPr>
-          <p:cNvPr id="3" name="CasellaDiTesto 2">
-            <a:extLst>
-              <a:ext uri="{FF2B5EF4-FFF2-40B4-BE49-F238E27FC236}">
-                <a16:creationId xmlns:a16="http://schemas.microsoft.com/office/drawing/2014/main" id="{49E446A2-CE3B-4DB1-B20D-0F385D0BED08}"/>
-              </a:ext>
-            </a:extLst>
-          </p:cNvPr>
-          <p:cNvSpPr txBox="1"/>
-          <p:nvPr/>
-        </p:nvSpPr>
-        <p:spPr>
-          <a:xfrm>
-            <a:off x="347797" y="740979"/>
-            <a:ext cx="8613462" cy="5909310"/>
-          </a:xfrm>
-          <a:prstGeom prst="rect">
-            <a:avLst/>
-          </a:prstGeom>
-          <a:noFill/>
-        </p:spPr>
-        <p:txBody>
-          <a:bodyPr wrap="square" rtlCol="0">
-            <a:spAutoFit/>
-          </a:bodyPr>
-          <a:lstStyle/>
-          <a:p>
-            <a:r>
-              <a:rPr lang="en-US" sz="2400" b="1" i="1" dirty="0"/>
-              <a:t>Source: </a:t>
-            </a:r>
-            <a:r>
-              <a:rPr lang="en-US" sz="2400" dirty="0"/>
-              <a:t>we</a:t>
-            </a:r>
-            <a:r>
-              <a:rPr lang="en-US" sz="2400" b="1" i="1" dirty="0"/>
-              <a:t> </a:t>
-            </a:r>
-            <a:r>
-              <a:rPr lang="en-GB" sz="2400" dirty="0"/>
-              <a:t>scraped from Yahoo Finance API the crypto historical values of the last 5 years (between 2017 and 2022) for each of the 10 most popular currencies:</a:t>
-            </a:r>
-          </a:p>
-          <a:p>
-            <a:endParaRPr lang="en-GB" sz="2400" dirty="0"/>
-          </a:p>
-          <a:p>
-            <a:pPr marL="2628900" lvl="5" indent="-342900">
-              <a:buFontTx/>
-              <a:buChar char="-"/>
-            </a:pPr>
-            <a:r>
-              <a:rPr lang="en-GB" sz="2400" dirty="0"/>
-              <a:t>Ethereum</a:t>
-            </a:r>
-          </a:p>
-          <a:p>
-            <a:pPr marL="2628900" lvl="5" indent="-342900">
-              <a:buFontTx/>
-              <a:buChar char="-"/>
-            </a:pPr>
-            <a:r>
-              <a:rPr lang="en-GB" sz="2400" dirty="0"/>
-              <a:t>Bitcoin</a:t>
-            </a:r>
-          </a:p>
-          <a:p>
-            <a:pPr marL="2628900" lvl="5" indent="-342900">
-              <a:buFontTx/>
-              <a:buChar char="-"/>
-            </a:pPr>
-            <a:r>
-              <a:rPr lang="en-GB" sz="2400" dirty="0"/>
-              <a:t>Tether</a:t>
-            </a:r>
-          </a:p>
-          <a:p>
-            <a:pPr marL="2628900" lvl="5" indent="-342900">
-              <a:buFontTx/>
-              <a:buChar char="-"/>
-            </a:pPr>
-            <a:r>
-              <a:rPr lang="en-GB" sz="2400" dirty="0" err="1"/>
-              <a:t>Binance</a:t>
-            </a:r>
-            <a:endParaRPr lang="en-GB" sz="2400" dirty="0"/>
-          </a:p>
-          <a:p>
-            <a:pPr marL="2628900" lvl="5" indent="-342900">
-              <a:buFontTx/>
-              <a:buChar char="-"/>
-            </a:pPr>
-            <a:r>
-              <a:rPr lang="en-GB" sz="2400" dirty="0"/>
-              <a:t>USD</a:t>
-            </a:r>
-          </a:p>
-          <a:p>
-            <a:pPr lvl="0"/>
-            <a:endParaRPr lang="en-US" sz="2400" b="1" i="1" dirty="0"/>
-          </a:p>
-          <a:p>
-            <a:pPr lvl="0"/>
-            <a:r>
-              <a:rPr lang="en-US" sz="2800" b="1" i="1" dirty="0"/>
-              <a:t>Description: </a:t>
-            </a:r>
-            <a:r>
-              <a:rPr lang="en-US" sz="2400" dirty="0"/>
-              <a:t>This dataset contains information on the past financial values of the currencies, in particular: data from the past 5 years from 10 different currencies for a total of 18.860 (365 * 5 years * 10 currencies) different tuples.</a:t>
-            </a:r>
-            <a:endParaRPr lang="en-US" sz="2800" b="1" i="1" dirty="0"/>
-          </a:p>
-          <a:p>
-            <a:pPr lvl="0"/>
-            <a:endParaRPr lang="en-US" sz="2000" b="1" i="1" dirty="0"/>
-          </a:p>
-          <a:p>
-            <a:endParaRPr lang="it-IT" dirty="0"/>
-          </a:p>
-        </p:txBody>
-      </p:sp>
-      <p:sp>
-        <p:nvSpPr>
-          <p:cNvPr id="4" name="CasellaDiTesto 3">
-            <a:extLst>
-              <a:ext uri="{FF2B5EF4-FFF2-40B4-BE49-F238E27FC236}">
-                <a16:creationId xmlns:a16="http://schemas.microsoft.com/office/drawing/2014/main" id="{8B85BA37-5F3C-492D-A898-9716D590A452}"/>
-              </a:ext>
-            </a:extLst>
-          </p:cNvPr>
-          <p:cNvSpPr txBox="1"/>
-          <p:nvPr/>
-        </p:nvSpPr>
-        <p:spPr>
-          <a:xfrm>
-            <a:off x="4903075" y="2191490"/>
-            <a:ext cx="1753429" cy="1938992"/>
-          </a:xfrm>
-          <a:prstGeom prst="rect">
-            <a:avLst/>
-          </a:prstGeom>
-          <a:noFill/>
-        </p:spPr>
-        <p:txBody>
-          <a:bodyPr wrap="none" rtlCol="0">
-            <a:spAutoFit/>
-          </a:bodyPr>
-          <a:lstStyle/>
-          <a:p>
-            <a:pPr marL="285750" indent="-285750">
-              <a:buFontTx/>
-              <a:buChar char="-"/>
-            </a:pPr>
-            <a:r>
-              <a:rPr lang="it-IT" sz="2400" dirty="0"/>
-              <a:t>XRP</a:t>
-            </a:r>
-          </a:p>
-          <a:p>
-            <a:pPr marL="285750" indent="-285750">
-              <a:buFontTx/>
-              <a:buChar char="-"/>
-            </a:pPr>
-            <a:r>
-              <a:rPr lang="it-IT" sz="2400" dirty="0"/>
-              <a:t>Cardano</a:t>
-            </a:r>
-          </a:p>
-          <a:p>
-            <a:pPr marL="285750" indent="-285750">
-              <a:buFontTx/>
-              <a:buChar char="-"/>
-            </a:pPr>
-            <a:r>
-              <a:rPr lang="it-IT" sz="2400" dirty="0" err="1"/>
-              <a:t>Solana</a:t>
-            </a:r>
-            <a:endParaRPr lang="it-IT" sz="2400" dirty="0"/>
-          </a:p>
-          <a:p>
-            <a:pPr marL="285750" indent="-285750">
-              <a:buFontTx/>
-              <a:buChar char="-"/>
-            </a:pPr>
-            <a:r>
-              <a:rPr lang="it-IT" sz="2400" dirty="0"/>
-              <a:t>Terra</a:t>
-            </a:r>
-          </a:p>
-          <a:p>
-            <a:pPr marL="285750" indent="-285750">
-              <a:buFontTx/>
-              <a:buChar char="-"/>
-            </a:pPr>
-            <a:r>
-              <a:rPr lang="it-IT" sz="2400" dirty="0" err="1"/>
-              <a:t>Avalanche</a:t>
-            </a:r>
-            <a:endParaRPr lang="it-IT" sz="2400" dirty="0"/>
-          </a:p>
-        </p:txBody>
-      </p:sp>
-    </p:spTree>
-    <p:extLst>
-      <p:ext uri="{BB962C8B-B14F-4D97-AF65-F5344CB8AC3E}">
-        <p14:creationId xmlns:p14="http://schemas.microsoft.com/office/powerpoint/2010/main" val="4285049540"/>
-      </p:ext>
-    </p:extLst>
-  </p:cSld>
-  <p:clrMapOvr>
-    <a:masterClrMapping/>
-  </p:clrMapOvr>
-</p:sld>
-</file>
-
-<file path=ppt/slides/slide6.xml><?xml version="1.0" encoding="utf-8"?>
+<file path=ppt/slides/slide7.xml><?xml version="1.0" encoding="utf-8"?>
 <p:sld xmlns:a="http://schemas.openxmlformats.org/drawingml/2006/main" xmlns:r="http://schemas.openxmlformats.org/officeDocument/2006/relationships" xmlns:p="http://schemas.openxmlformats.org/presentationml/2006/main">
   <p:cSld>
     <p:spTree>
@@ -5657,10 +5819,10 @@
       </p:grpSpPr>
       <p:pic>
         <p:nvPicPr>
-          <p:cNvPr id="4" name="Immagine 3">
+          <p:cNvPr id="6" name="Immagine 5">
             <a:extLst>
               <a:ext uri="{FF2B5EF4-FFF2-40B4-BE49-F238E27FC236}">
-                <a16:creationId xmlns:a16="http://schemas.microsoft.com/office/drawing/2014/main" id="{4B35046C-0DA5-4D99-BF08-3D062AAAB59C}"/>
+                <a16:creationId xmlns:a16="http://schemas.microsoft.com/office/drawing/2014/main" id="{7C1FB875-46BB-419E-8322-8D9D37820A46}"/>
               </a:ext>
             </a:extLst>
           </p:cNvPr>
@@ -5677,8 +5839,8 @@
         </p:blipFill>
         <p:spPr>
           <a:xfrm>
-            <a:off x="1141396" y="1874535"/>
-            <a:ext cx="6844486" cy="3928735"/>
+            <a:off x="1296498" y="1015472"/>
+            <a:ext cx="6551004" cy="4827055"/>
           </a:xfrm>
           <a:prstGeom prst="rect">
             <a:avLst/>
@@ -5687,10 +5849,10 @@
       </p:pic>
       <p:sp>
         <p:nvSpPr>
-          <p:cNvPr id="5" name="Titolo 1">
+          <p:cNvPr id="7" name="Titolo 1">
             <a:extLst>
               <a:ext uri="{FF2B5EF4-FFF2-40B4-BE49-F238E27FC236}">
-                <a16:creationId xmlns:a16="http://schemas.microsoft.com/office/drawing/2014/main" id="{E766A7C9-84F1-4595-8E00-FFC8EE6989AC}"/>
+                <a16:creationId xmlns:a16="http://schemas.microsoft.com/office/drawing/2014/main" id="{C1BCFCBD-3FB1-4FA4-8408-7F5D52C58C6A}"/>
               </a:ext>
             </a:extLst>
           </p:cNvPr>
@@ -5704,92 +5866,39 @@
         <p:spPr>
           <a:xfrm>
             <a:off x="182741" y="90093"/>
-            <a:ext cx="8761797" cy="1143000"/>
-          </a:xfrm>
-        </p:spPr>
-        <p:txBody>
-          <a:bodyPr/>
-          <a:lstStyle/>
-          <a:p>
-            <a:r>
-              <a:rPr lang="it-IT" dirty="0"/>
-              <a:t>Dataset </a:t>
-            </a:r>
-            <a:r>
-              <a:rPr lang="it-IT" dirty="0" err="1"/>
-              <a:t>Description</a:t>
-            </a:r>
-            <a:r>
-              <a:rPr lang="it-IT" dirty="0"/>
-              <a:t> II</a:t>
-            </a:r>
-          </a:p>
-        </p:txBody>
-      </p:sp>
-      <p:sp>
-        <p:nvSpPr>
-          <p:cNvPr id="2" name="CasellaDiTesto 1">
-            <a:extLst>
-              <a:ext uri="{FF2B5EF4-FFF2-40B4-BE49-F238E27FC236}">
-                <a16:creationId xmlns:a16="http://schemas.microsoft.com/office/drawing/2014/main" id="{F64E6CBA-C8CE-453B-A0C9-92E0C1925620}"/>
-              </a:ext>
-            </a:extLst>
-          </p:cNvPr>
-          <p:cNvSpPr txBox="1"/>
-          <p:nvPr/>
-        </p:nvSpPr>
-        <p:spPr>
-          <a:xfrm>
-            <a:off x="1141396" y="1369148"/>
-            <a:ext cx="4901214" cy="369332"/>
-          </a:xfrm>
-          <a:prstGeom prst="rect">
-            <a:avLst/>
-          </a:prstGeom>
-          <a:noFill/>
-        </p:spPr>
-        <p:txBody>
-          <a:bodyPr wrap="none" rtlCol="0">
-            <a:spAutoFit/>
+            <a:ext cx="8761797" cy="619355"/>
+          </a:xfrm>
+        </p:spPr>
+        <p:txBody>
+          <a:bodyPr vert="horz" lIns="91440" tIns="45720" rIns="91440" bIns="45720" rtlCol="0" anchor="ctr">
+            <a:normAutofit fontScale="90000"/>
           </a:bodyPr>
           <a:lstStyle/>
           <a:p>
             <a:r>
+              <a:rPr lang="it-IT" dirty="0"/>
+              <a:t>Cross </a:t>
+            </a:r>
+            <a:r>
               <a:rPr lang="it-IT" dirty="0" err="1"/>
-              <a:t>This</a:t>
+              <a:t>Validation</a:t>
             </a:r>
             <a:r>
               <a:rPr lang="it-IT" dirty="0"/>
-              <a:t> dataset </a:t>
-            </a:r>
-            <a:r>
-              <a:rPr lang="it-IT" dirty="0" err="1"/>
-              <a:t>refers</a:t>
-            </a:r>
-            <a:r>
-              <a:rPr lang="it-IT" dirty="0"/>
-              <a:t> </a:t>
-            </a:r>
-            <a:r>
-              <a:rPr lang="it-IT" dirty="0" err="1"/>
-              <a:t>only</a:t>
-            </a:r>
-            <a:r>
-              <a:rPr lang="it-IT" dirty="0"/>
-              <a:t> to a single </a:t>
-            </a:r>
-            <a:r>
-              <a:rPr lang="it-IT" dirty="0" err="1"/>
-              <a:t>crypto-currency</a:t>
-            </a:r>
-            <a:endParaRPr lang="it-IT" dirty="0"/>
+              <a:t> for Time Series</a:t>
+            </a:r>
+            <a:endParaRPr lang="it-IT" kern="1200" dirty="0">
+              <a:latin typeface="+mj-lt"/>
+              <a:ea typeface="+mj-ea"/>
+              <a:cs typeface="+mj-cs"/>
+            </a:endParaRPr>
           </a:p>
         </p:txBody>
       </p:sp>
     </p:spTree>
     <p:extLst>
       <p:ext uri="{BB962C8B-B14F-4D97-AF65-F5344CB8AC3E}">
-        <p14:creationId xmlns:p14="http://schemas.microsoft.com/office/powerpoint/2010/main" val="175535551"/>
+        <p14:creationId xmlns:p14="http://schemas.microsoft.com/office/powerpoint/2010/main" val="3341734329"/>
       </p:ext>
     </p:extLst>
   </p:cSld>
@@ -5799,7 +5908,7 @@
 </p:sld>
 </file>
 
-<file path=ppt/slides/slide7.xml><?xml version="1.0" encoding="utf-8"?>
+<file path=ppt/slides/slide8.xml><?xml version="1.0" encoding="utf-8"?>
 <p:sld xmlns:a="http://schemas.openxmlformats.org/drawingml/2006/main" xmlns:r="http://schemas.openxmlformats.org/officeDocument/2006/relationships" xmlns:p="http://schemas.openxmlformats.org/presentationml/2006/main">
   <p:cSld>
     <p:spTree>
@@ -5894,7 +6003,7 @@
 </p:sld>
 </file>
 
-<file path=ppt/slides/slide8.xml><?xml version="1.0" encoding="utf-8"?>
+<file path=ppt/slides/slide9.xml><?xml version="1.0" encoding="utf-8"?>
 <p:sld xmlns:a="http://schemas.openxmlformats.org/drawingml/2006/main" xmlns:r="http://schemas.openxmlformats.org/officeDocument/2006/relationships" xmlns:p="http://schemas.openxmlformats.org/presentationml/2006/main">
   <p:cSld>
     <p:spTree>
@@ -6714,21 +6823,6 @@
 </file>
 
 <file path=customXml/item1.xml><?xml version="1.0" encoding="utf-8"?>
-<p:properties xmlns:p="http://schemas.microsoft.com/office/2006/metadata/properties" xmlns:xsi="http://www.w3.org/2001/XMLSchema-instance" xmlns:pc="http://schemas.microsoft.com/office/infopath/2007/PartnerControls">
-  <documentManagement/>
-</p:properties>
-</file>
-
-<file path=customXml/item2.xml><?xml version="1.0" encoding="utf-8"?>
-<?mso-contentType ?>
-<FormTemplates xmlns="http://schemas.microsoft.com/sharepoint/v3/contenttype/forms">
-  <Display>DocumentLibraryForm</Display>
-  <Edit>DocumentLibraryForm</Edit>
-  <New>DocumentLibraryForm</New>
-</FormTemplates>
-</file>
-
-<file path=customXml/item3.xml><?xml version="1.0" encoding="utf-8"?>
 <ct:contentTypeSchema xmlns:ct="http://schemas.microsoft.com/office/2006/metadata/contentType" xmlns:ma="http://schemas.microsoft.com/office/2006/metadata/properties/metaAttributes" ct:_="" ma:_="" ma:contentTypeName="Document" ma:contentTypeID="0x0101008A9D8249050D244AB3291E25E44E9E61" ma:contentTypeVersion="10" ma:contentTypeDescription="Create a new document." ma:contentTypeScope="" ma:versionID="5bcc32f3e2490526e9ee38f82e5ffa8c">
   <xsd:schema xmlns:xsd="http://www.w3.org/2001/XMLSchema" xmlns:xs="http://www.w3.org/2001/XMLSchema" xmlns:p="http://schemas.microsoft.com/office/2006/metadata/properties" xmlns:ns2="66de5014-e8da-4796-bdfb-c10b0cfdf816" xmlns:ns3="a004e035-50b8-418f-b096-b0421c71bc5c" targetNamespace="http://schemas.microsoft.com/office/2006/metadata/properties" ma:root="true" ma:fieldsID="11b0199ca358179a749c84ea1bbc5869" ns2:_="" ns3:_="">
     <xsd:import namespace="66de5014-e8da-4796-bdfb-c10b0cfdf816"/>
@@ -6933,32 +7027,22 @@
 </ct:contentTypeSchema>
 </file>
 
-<file path=customXml/itemProps1.xml><?xml version="1.0" encoding="utf-8"?>
-<ds:datastoreItem xmlns:ds="http://schemas.openxmlformats.org/officeDocument/2006/customXml" ds:itemID="{835D7783-1711-45C5-B530-A4F9FC3EE6D1}">
-  <ds:schemaRefs>
-    <ds:schemaRef ds:uri="66de5014-e8da-4796-bdfb-c10b0cfdf816"/>
-    <ds:schemaRef ds:uri="a004e035-50b8-418f-b096-b0421c71bc5c"/>
-    <ds:schemaRef ds:uri="http://purl.org/dc/dcmitype/"/>
-    <ds:schemaRef ds:uri="http://purl.org/dc/elements/1.1/"/>
-    <ds:schemaRef ds:uri="http://purl.org/dc/terms/"/>
-    <ds:schemaRef ds:uri="http://schemas.microsoft.com/office/2006/documentManagement/types"/>
-    <ds:schemaRef ds:uri="http://schemas.microsoft.com/office/2006/metadata/properties"/>
-    <ds:schemaRef ds:uri="http://schemas.microsoft.com/office/infopath/2007/PartnerControls"/>
-    <ds:schemaRef ds:uri="http://schemas.openxmlformats.org/package/2006/metadata/core-properties"/>
-    <ds:schemaRef ds:uri="http://www.w3.org/XML/1998/namespace"/>
-  </ds:schemaRefs>
-</ds:datastoreItem>
+<file path=customXml/item2.xml><?xml version="1.0" encoding="utf-8"?>
+<?mso-contentType ?>
+<FormTemplates xmlns="http://schemas.microsoft.com/sharepoint/v3/contenttype/forms">
+  <Display>DocumentLibraryForm</Display>
+  <Edit>DocumentLibraryForm</Edit>
+  <New>DocumentLibraryForm</New>
+</FormTemplates>
 </file>
 
-<file path=customXml/itemProps2.xml><?xml version="1.0" encoding="utf-8"?>
-<ds:datastoreItem xmlns:ds="http://schemas.openxmlformats.org/officeDocument/2006/customXml" ds:itemID="{57CA7C9D-AF7D-4D5C-9896-01312A7F0DBD}">
-  <ds:schemaRefs>
-    <ds:schemaRef ds:uri="http://schemas.microsoft.com/sharepoint/v3/contenttype/forms"/>
-  </ds:schemaRefs>
-</ds:datastoreItem>
+<file path=customXml/item3.xml><?xml version="1.0" encoding="utf-8"?>
+<p:properties xmlns:p="http://schemas.microsoft.com/office/2006/metadata/properties" xmlns:xsi="http://www.w3.org/2001/XMLSchema-instance" xmlns:pc="http://schemas.microsoft.com/office/infopath/2007/PartnerControls">
+  <documentManagement/>
+</p:properties>
 </file>
 
-<file path=customXml/itemProps3.xml><?xml version="1.0" encoding="utf-8"?>
+<file path=customXml/itemProps1.xml><?xml version="1.0" encoding="utf-8"?>
 <ds:datastoreItem xmlns:ds="http://schemas.openxmlformats.org/officeDocument/2006/customXml" ds:itemID="{EC6D4714-D130-453E-878E-16EADBED566F}">
   <ds:schemaRefs>
     <ds:schemaRef ds:uri="66de5014-e8da-4796-bdfb-c10b0cfdf816"/>
@@ -6975,4 +7059,29 @@
     <ds:schemaRef ds:uri="http://www.w3.org/2001/XMLSchema"/>
   </ds:schemaRefs>
 </ds:datastoreItem>
+</file>
+
+<file path=customXml/itemProps2.xml><?xml version="1.0" encoding="utf-8"?>
+<ds:datastoreItem xmlns:ds="http://schemas.openxmlformats.org/officeDocument/2006/customXml" ds:itemID="{57CA7C9D-AF7D-4D5C-9896-01312A7F0DBD}">
+  <ds:schemaRefs>
+    <ds:schemaRef ds:uri="http://schemas.microsoft.com/sharepoint/v3/contenttype/forms"/>
+  </ds:schemaRefs>
+</ds:datastoreItem>
+</file>
+
+<file path=customXml/itemProps3.xml><?xml version="1.0" encoding="utf-8"?>
+<ds:datastoreItem xmlns:ds="http://schemas.openxmlformats.org/officeDocument/2006/customXml" ds:itemID="{835D7783-1711-45C5-B530-A4F9FC3EE6D1}">
+  <ds:schemaRefs>
+    <ds:schemaRef ds:uri="66de5014-e8da-4796-bdfb-c10b0cfdf816"/>
+    <ds:schemaRef ds:uri="a004e035-50b8-418f-b096-b0421c71bc5c"/>
+    <ds:schemaRef ds:uri="http://purl.org/dc/dcmitype/"/>
+    <ds:schemaRef ds:uri="http://purl.org/dc/elements/1.1/"/>
+    <ds:schemaRef ds:uri="http://purl.org/dc/terms/"/>
+    <ds:schemaRef ds:uri="http://schemas.microsoft.com/office/2006/documentManagement/types"/>
+    <ds:schemaRef ds:uri="http://schemas.microsoft.com/office/2006/metadata/properties"/>
+    <ds:schemaRef ds:uri="http://schemas.microsoft.com/office/infopath/2007/PartnerControls"/>
+    <ds:schemaRef ds:uri="http://schemas.openxmlformats.org/package/2006/metadata/core-properties"/>
+    <ds:schemaRef ds:uri="http://www.w3.org/XML/1998/namespace"/>
+  </ds:schemaRefs>
+</ds:datastoreItem>
 </file>
</xml_diff>